<commit_message>
added final paper folder and current progress
</commit_message>
<xml_diff>
--- a/585PosterHam.pptx
+++ b/585PosterHam.pptx
@@ -3227,7 +3227,11 @@
             </a:r>
             <a:r>
               <a:rPr lang="en-US" dirty="0" smtClean="0"/>
-              <a:t>representation</a:t>
+              <a:t>representation.</a:t>
+            </a:r>
+            <a:r>
+              <a:rPr lang="en-US" dirty="0" smtClean="0"/>
+              <a:t/>
             </a:r>
             <a:br>
               <a:rPr lang="en-US" dirty="0" smtClean="0"/>
@@ -3244,8 +3248,13 @@
             </a:br>
             <a:r>
               <a:rPr lang="en-US" dirty="0"/>
-              <a:t>optimal hyper-parameters</a:t>
-            </a:r>
+              <a:t>optimal </a:t>
+            </a:r>
+            <a:r>
+              <a:rPr lang="en-US" dirty="0" smtClean="0"/>
+              <a:t>hyper-parameters.</a:t>
+            </a:r>
+            <a:endParaRPr lang="en-US" dirty="0"/>
           </a:p>
           <a:p>
             <a:endParaRPr lang="en-US" dirty="0"/>
@@ -3508,21 +3517,14 @@
                   <a:latin typeface="Helvetica" panose="020B0604020202020204" pitchFamily="34" charset="0"/>
                   <a:cs typeface="Helvetica" panose="020B0604020202020204" pitchFamily="34" charset="0"/>
                 </a:rPr>
-                <a:t>L1, L2</a:t>
+                <a:t>L1, L2, </a:t>
               </a:r>
               <a:r>
                 <a:rPr lang="en-US" sz="3200" dirty="0" smtClean="0">
                   <a:latin typeface="Helvetica" panose="020B0604020202020204" pitchFamily="34" charset="0"/>
                   <a:cs typeface="Helvetica" panose="020B0604020202020204" pitchFamily="34" charset="0"/>
                 </a:rPr>
-                <a:t>, </a:t>
-              </a:r>
-              <a:r>
-                <a:rPr lang="en-US" sz="3200" dirty="0" smtClean="0">
-                  <a:latin typeface="Helvetica" panose="020B0604020202020204" pitchFamily="34" charset="0"/>
-                  <a:cs typeface="Helvetica" panose="020B0604020202020204" pitchFamily="34" charset="0"/>
-                </a:rPr>
-                <a:t>None</a:t>
+                <a:t>None.</a:t>
               </a:r>
               <a:endParaRPr lang="en-US" sz="3200" dirty="0">
                 <a:latin typeface="Helvetica" panose="020B0604020202020204" pitchFamily="34" charset="0"/>
@@ -3539,7 +3541,21 @@
                   <a:latin typeface="Helvetica" panose="020B0604020202020204" pitchFamily="34" charset="0"/>
                   <a:cs typeface="Helvetica" panose="020B0604020202020204" pitchFamily="34" charset="0"/>
                 </a:rPr>
-                <a:t>Range of Alphas Searched</a:t>
+                <a:t>Range of Alphas </a:t>
+              </a:r>
+              <a:r>
+                <a:rPr lang="en-US" sz="3200" dirty="0" smtClean="0">
+                  <a:latin typeface="Helvetica" panose="020B0604020202020204" pitchFamily="34" charset="0"/>
+                  <a:cs typeface="Helvetica" panose="020B0604020202020204" pitchFamily="34" charset="0"/>
+                </a:rPr>
+                <a:t>Searched.</a:t>
+              </a:r>
+              <a:r>
+                <a:rPr lang="en-US" sz="3200" dirty="0" smtClean="0">
+                  <a:latin typeface="Helvetica" panose="020B0604020202020204" pitchFamily="34" charset="0"/>
+                  <a:cs typeface="Helvetica" panose="020B0604020202020204" pitchFamily="34" charset="0"/>
+                </a:rPr>
+                <a:t/>
               </a:r>
               <a:br>
                 <a:rPr lang="en-US" sz="3200" dirty="0" smtClean="0">
@@ -3575,7 +3591,14 @@
                   <a:latin typeface="Helvetica" panose="020B0604020202020204" pitchFamily="34" charset="0"/>
                   <a:cs typeface="Helvetica" panose="020B0604020202020204" pitchFamily="34" charset="0"/>
                 </a:rPr>
-                <a:t>optimal hyper-parameters</a:t>
+                <a:t>optimal </a:t>
+              </a:r>
+              <a:r>
+                <a:rPr lang="en-US" sz="3200" dirty="0" smtClean="0">
+                  <a:latin typeface="Helvetica" panose="020B0604020202020204" pitchFamily="34" charset="0"/>
+                  <a:cs typeface="Helvetica" panose="020B0604020202020204" pitchFamily="34" charset="0"/>
+                </a:rPr>
+                <a:t>hyper-parameters.</a:t>
               </a:r>
               <a:endParaRPr lang="en-US" sz="3200" dirty="0">
                 <a:latin typeface="Helvetica" panose="020B0604020202020204" pitchFamily="34" charset="0"/>
@@ -3669,7 +3692,14 @@
                   <a:latin typeface="Helvetica" panose="020B0604020202020204" pitchFamily="34" charset="0"/>
                   <a:cs typeface="Helvetica" panose="020B0604020202020204" pitchFamily="34" charset="0"/>
                 </a:rPr>
-                <a:t>Cornell</a:t>
+                <a:t>Cornell.</a:t>
+              </a:r>
+              <a:r>
+                <a:rPr lang="en-US" sz="3200" dirty="0" smtClean="0">
+                  <a:latin typeface="Helvetica" panose="020B0604020202020204" pitchFamily="34" charset="0"/>
+                  <a:cs typeface="Helvetica" panose="020B0604020202020204" pitchFamily="34" charset="0"/>
+                </a:rPr>
+                <a:t/>
               </a:r>
               <a:br>
                 <a:rPr lang="en-US" sz="3200" dirty="0" smtClean="0">
@@ -3825,13 +3855,10 @@
               </a:r>
             </a:p>
             <a:p>
-              <a:r>
-                <a:rPr lang="en-US" sz="3200" dirty="0">
-                  <a:latin typeface="Helvetica" panose="020B0604020202020204" pitchFamily="34" charset="0"/>
-                  <a:cs typeface="Helvetica" panose="020B0604020202020204" pitchFamily="34" charset="0"/>
-                </a:rPr>
-                <a:t>.</a:t>
-              </a:r>
+              <a:endParaRPr lang="en-US" sz="3200" dirty="0">
+                <a:latin typeface="Helvetica" panose="020B0604020202020204" pitchFamily="34" charset="0"/>
+                <a:cs typeface="Helvetica" panose="020B0604020202020204" pitchFamily="34" charset="0"/>
+              </a:endParaRPr>
             </a:p>
           </p:txBody>
         </p:sp>
@@ -4123,7 +4150,14 @@
                   <a:latin typeface="Helvetica" panose="020B0604020202020204" pitchFamily="34" charset="0"/>
                   <a:cs typeface="Helvetica" panose="020B0604020202020204" pitchFamily="34" charset="0"/>
                 </a:rPr>
-                <a:t>penalty ,Bigram LM, </a:t>
+                <a:t>penalty, Bigram </a:t>
+              </a:r>
+              <a:r>
+                <a:rPr lang="en-US" sz="3200" dirty="0" smtClean="0">
+                  <a:latin typeface="Helvetica" panose="020B0604020202020204" pitchFamily="34" charset="0"/>
+                  <a:cs typeface="Helvetica" panose="020B0604020202020204" pitchFamily="34" charset="0"/>
+                </a:rPr>
+                <a:t>LM, </a:t>
               </a:r>
               <a:r>
                 <a:rPr lang="en-US" sz="3200" dirty="0" err="1" smtClean="0">
@@ -4137,7 +4171,14 @@
                   <a:latin typeface="Helvetica" panose="020B0604020202020204" pitchFamily="34" charset="0"/>
                   <a:cs typeface="Helvetica" panose="020B0604020202020204" pitchFamily="34" charset="0"/>
                 </a:rPr>
-                <a:t>, and Alpha=.0002</a:t>
+                <a:t>, and Alpha=.</a:t>
+              </a:r>
+              <a:r>
+                <a:rPr lang="en-US" sz="3200" dirty="0" smtClean="0">
+                  <a:latin typeface="Helvetica" panose="020B0604020202020204" pitchFamily="34" charset="0"/>
+                  <a:cs typeface="Helvetica" panose="020B0604020202020204" pitchFamily="34" charset="0"/>
+                </a:rPr>
+                <a:t>0002.</a:t>
               </a:r>
               <a:endParaRPr lang="en-US" sz="3200" dirty="0">
                 <a:latin typeface="Helvetica" panose="020B0604020202020204" pitchFamily="34" charset="0"/>
@@ -4390,7 +4431,21 @@
                   <a:latin typeface="Helvetica" panose="020B0604020202020204" pitchFamily="34" charset="0"/>
                   <a:cs typeface="Helvetica" panose="020B0604020202020204" pitchFamily="34" charset="0"/>
                 </a:rPr>
-                <a:t>Increased accuracy for all classifiers</a:t>
+                <a:t>Increased accuracy for </a:t>
+              </a:r>
+              <a:r>
+                <a:rPr lang="en-US" sz="3200" smtClean="0">
+                  <a:latin typeface="Helvetica" panose="020B0604020202020204" pitchFamily="34" charset="0"/>
+                  <a:cs typeface="Helvetica" panose="020B0604020202020204" pitchFamily="34" charset="0"/>
+                </a:rPr>
+                <a:t>all </a:t>
+              </a:r>
+              <a:r>
+                <a:rPr lang="en-US" sz="3200" smtClean="0">
+                  <a:latin typeface="Helvetica" panose="020B0604020202020204" pitchFamily="34" charset="0"/>
+                  <a:cs typeface="Helvetica" panose="020B0604020202020204" pitchFamily="34" charset="0"/>
+                </a:rPr>
+                <a:t>classifiers.</a:t>
               </a:r>
               <a:endParaRPr lang="en-US" sz="3200" dirty="0">
                 <a:latin typeface="Helvetica" panose="020B0604020202020204" pitchFamily="34" charset="0"/>

</xml_diff>